<commit_message>
Updated for Data Science and Analytics
At MU
</commit_message>
<xml_diff>
--- a/week2/Analytics.pptx
+++ b/week2/Analytics.pptx
@@ -201,7 +201,7 @@
           <a:p>
             <a:fld id="{AA31EFAD-1D08-944E-A7DC-1DD4DF105740}" type="datetimeFigureOut">
               <a:rPr lang="en-US" smtClean="0"/>
-              <a:t>4/9/13</a:t>
+              <a:t>2/3/16</a:t>
             </a:fld>
             <a:endParaRPr lang="en-US"/>
           </a:p>
@@ -1154,7 +1154,7 @@
           <a:p>
             <a:fld id="{BE220FD4-93CD-7244-A23F-442068751558}" type="datetimeFigureOut">
               <a:rPr lang="en-US" smtClean="0"/>
-              <a:t>4/9/13</a:t>
+              <a:t>2/3/16</a:t>
             </a:fld>
             <a:endParaRPr lang="en-US"/>
           </a:p>
@@ -1324,7 +1324,7 @@
           <a:p>
             <a:fld id="{BE220FD4-93CD-7244-A23F-442068751558}" type="datetimeFigureOut">
               <a:rPr lang="en-US" smtClean="0"/>
-              <a:t>4/9/13</a:t>
+              <a:t>2/3/16</a:t>
             </a:fld>
             <a:endParaRPr lang="en-US"/>
           </a:p>
@@ -1504,7 +1504,7 @@
           <a:p>
             <a:fld id="{BE220FD4-93CD-7244-A23F-442068751558}" type="datetimeFigureOut">
               <a:rPr lang="en-US" smtClean="0"/>
-              <a:t>4/9/13</a:t>
+              <a:t>2/3/16</a:t>
             </a:fld>
             <a:endParaRPr lang="en-US"/>
           </a:p>
@@ -1674,7 +1674,7 @@
           <a:p>
             <a:fld id="{BE220FD4-93CD-7244-A23F-442068751558}" type="datetimeFigureOut">
               <a:rPr lang="en-US" smtClean="0"/>
-              <a:t>4/9/13</a:t>
+              <a:t>2/3/16</a:t>
             </a:fld>
             <a:endParaRPr lang="en-US"/>
           </a:p>
@@ -1920,7 +1920,7 @@
           <a:p>
             <a:fld id="{BE220FD4-93CD-7244-A23F-442068751558}" type="datetimeFigureOut">
               <a:rPr lang="en-US" smtClean="0"/>
-              <a:t>4/9/13</a:t>
+              <a:t>2/3/16</a:t>
             </a:fld>
             <a:endParaRPr lang="en-US"/>
           </a:p>
@@ -2208,7 +2208,7 @@
           <a:p>
             <a:fld id="{BE220FD4-93CD-7244-A23F-442068751558}" type="datetimeFigureOut">
               <a:rPr lang="en-US" smtClean="0"/>
-              <a:t>4/9/13</a:t>
+              <a:t>2/3/16</a:t>
             </a:fld>
             <a:endParaRPr lang="en-US"/>
           </a:p>
@@ -2630,7 +2630,7 @@
           <a:p>
             <a:fld id="{BE220FD4-93CD-7244-A23F-442068751558}" type="datetimeFigureOut">
               <a:rPr lang="en-US" smtClean="0"/>
-              <a:t>4/9/13</a:t>
+              <a:t>2/3/16</a:t>
             </a:fld>
             <a:endParaRPr lang="en-US"/>
           </a:p>
@@ -2748,7 +2748,7 @@
           <a:p>
             <a:fld id="{BE220FD4-93CD-7244-A23F-442068751558}" type="datetimeFigureOut">
               <a:rPr lang="en-US" smtClean="0"/>
-              <a:t>4/9/13</a:t>
+              <a:t>2/3/16</a:t>
             </a:fld>
             <a:endParaRPr lang="en-US"/>
           </a:p>
@@ -2843,7 +2843,7 @@
           <a:p>
             <a:fld id="{BE220FD4-93CD-7244-A23F-442068751558}" type="datetimeFigureOut">
               <a:rPr lang="en-US" smtClean="0"/>
-              <a:t>4/9/13</a:t>
+              <a:t>2/3/16</a:t>
             </a:fld>
             <a:endParaRPr lang="en-US"/>
           </a:p>
@@ -3120,7 +3120,7 @@
           <a:p>
             <a:fld id="{BE220FD4-93CD-7244-A23F-442068751558}" type="datetimeFigureOut">
               <a:rPr lang="en-US" smtClean="0"/>
-              <a:t>4/9/13</a:t>
+              <a:t>2/3/16</a:t>
             </a:fld>
             <a:endParaRPr lang="en-US"/>
           </a:p>
@@ -3373,7 +3373,7 @@
           <a:p>
             <a:fld id="{BE220FD4-93CD-7244-A23F-442068751558}" type="datetimeFigureOut">
               <a:rPr lang="en-US" smtClean="0"/>
-              <a:t>4/9/13</a:t>
+              <a:t>2/3/16</a:t>
             </a:fld>
             <a:endParaRPr lang="en-US"/>
           </a:p>
@@ -3586,7 +3586,7 @@
           <a:p>
             <a:fld id="{BE220FD4-93CD-7244-A23F-442068751558}" type="datetimeFigureOut">
               <a:rPr lang="en-US" smtClean="0"/>
-              <a:t>4/9/13</a:t>
+              <a:t>2/3/16</a:t>
             </a:fld>
             <a:endParaRPr lang="en-US"/>
           </a:p>
@@ -3999,10 +3999,6 @@
           <a:bodyPr/>
           <a:lstStyle/>
           <a:p>
-            <a:r>
-              <a:rPr lang="en-US" dirty="0" smtClean="0"/>
-              <a:t>Week Two – INFO 480 – Introduction to Data Science</a:t>
-            </a:r>
             <a:endParaRPr lang="en-US" dirty="0"/>
           </a:p>
         </p:txBody>
@@ -4061,7 +4057,11 @@
           <a:p>
             <a:r>
               <a:rPr lang="en-US" dirty="0" smtClean="0"/>
-              <a:t>The Assignment: Week Two</a:t>
+              <a:t>The </a:t>
+            </a:r>
+            <a:r>
+              <a:rPr lang="en-US" dirty="0" smtClean="0"/>
+              <a:t>Assignment</a:t>
             </a:r>
             <a:endParaRPr lang="en-US" dirty="0"/>
           </a:p>
@@ -4080,22 +4080,15 @@
         <p:spPr/>
         <p:txBody>
           <a:bodyPr>
-            <a:normAutofit fontScale="55000" lnSpcReduction="20000"/>
+            <a:normAutofit fontScale="70000" lnSpcReduction="20000"/>
           </a:bodyPr>
           <a:lstStyle/>
           <a:p>
             <a:r>
               <a:rPr lang="en-US" dirty="0" smtClean="0"/>
-              <a:t>This is first and foremost an analysis assignment and an assignment focused on familiarizing yourself with what R can help you with.  A full, working sample is provided on </a:t>
-            </a:r>
-            <a:r>
-              <a:rPr lang="en-US" dirty="0" err="1" smtClean="0"/>
-              <a:t>GitHub</a:t>
-            </a:r>
-            <a:r>
-              <a:rPr lang="en-US" dirty="0" smtClean="0"/>
-              <a:t>.  If you download the Full Zip File, you will have access to the data under the “Week2” directory”</a:t>
-            </a:r>
+              <a:t>There is a directory called “Week 2” in the zip file you can download from the Canvas Site.</a:t>
+            </a:r>
+            <a:endParaRPr lang="en-US" dirty="0" smtClean="0"/>
           </a:p>
           <a:p>
             <a:pPr lvl="1"/>
@@ -4129,30 +4122,13 @@
             <a:pPr lvl="1"/>
             <a:r>
               <a:rPr lang="en-US" dirty="0" smtClean="0"/>
-              <a:t>Build a network using the scripts from week1 against the mention connections?  Reply-To connections? In this sample data.  What transformations are required? How would you filter the data?  Use the actual data to ground your thinking.  Feel free to actually write or modify the R code samples from the first two weeks to experiment.  Some of you will be more comfortable doing this; some will be more comfortable addressing the question conceptually. This is OK.</a:t>
-            </a:r>
-          </a:p>
-          <a:p>
-            <a:pPr lvl="1"/>
+              <a:t>Build a network using the scripts from week1 against the mention connections?  Reply-To connections? In this sample data.  What transformations are required? How would you filter the data?  Use the actual data to ground your thinking.  Feel free to actually write or modify the R code samples from the first two weeks to experiment.  Some of you will be more comfortable doing this; some will be more comfortable addressing the question conceptually. This is OK</a:t>
+            </a:r>
             <a:r>
               <a:rPr lang="en-US" dirty="0" smtClean="0"/>
-              <a:t>Submit any issues you encounter to </a:t>
-            </a:r>
-            <a:r>
-              <a:rPr lang="en-US" dirty="0" err="1" smtClean="0"/>
-              <a:t>GitHub</a:t>
-            </a:r>
-            <a:r>
-              <a:rPr lang="en-US" dirty="0" smtClean="0"/>
-              <a:t> under this repository</a:t>
-            </a:r>
-          </a:p>
-          <a:p>
-            <a:r>
-              <a:rPr lang="en-US" dirty="0" smtClean="0"/>
-              <a:t>I will open a discussion board under our Blackboard Shell regarding the three papers you were assigned to read last week.  I expect you to answer the questions and respond to your classmates.  Your participation does not need to be long, just thoughtful.</a:t>
-            </a:r>
-            <a:endParaRPr lang="en-US" dirty="0"/>
+              <a:t>.</a:t>
+            </a:r>
+            <a:endParaRPr lang="en-US" dirty="0" smtClean="0"/>
           </a:p>
         </p:txBody>
       </p:sp>
@@ -5566,12 +5542,12 @@
           <a:graphicData uri="http://schemas.openxmlformats.org/presentationml/2006/ole">
             <mc:AlternateContent xmlns:mc="http://schemas.openxmlformats.org/markup-compatibility/2006">
               <mc:Choice xmlns:v="urn:schemas-microsoft-com:vml" Requires="v">
-                <p:oleObj spid="_x0000_s1045" name="Document" r:id="rId3" imgW="6096000" imgH="4114800" progId="Word.Document.12">
+                <p:oleObj spid="_x0000_s1047" name="Document" r:id="rId4" imgW="6096000" imgH="4114800" progId="Word.Document.12">
                   <p:embed/>
                 </p:oleObj>
               </mc:Choice>
               <mc:Fallback>
-                <p:oleObj name="Document" r:id="rId3" imgW="6096000" imgH="4114800" progId="Word.Document.12">
+                <p:oleObj name="Document" r:id="rId4" imgW="6096000" imgH="4114800" progId="Word.Document.12">
                   <p:embed/>
                   <p:pic>
                     <p:nvPicPr>
@@ -5580,7 +5556,7 @@
                       <p:nvPr/>
                     </p:nvPicPr>
                     <p:blipFill>
-                      <a:blip r:embed="rId4"/>
+                      <a:blip r:embed="rId5"/>
                       <a:stretch>
                         <a:fillRect/>
                       </a:stretch>

</xml_diff>